<commit_message>
added additional charts, and images, as well as unity plugin reference
</commit_message>
<xml_diff>
--- a/03_Figures/07_Suggestion/NavigationMap.pptx
+++ b/03_Figures/07_Suggestion/NavigationMap.pptx
@@ -6,6 +6,7 @@
   </p:sldMasterIdLst>
   <p:sldIdLst>
     <p:sldId id="256" r:id="rId2"/>
+    <p:sldId id="257" r:id="rId3"/>
   </p:sldIdLst>
   <p:sldSz cx="12192000" cy="6858000"/>
   <p:notesSz cx="6858000" cy="9144000"/>
@@ -243,7 +244,7 @@
           <a:p>
             <a:fld id="{771DAF8F-959D-484A-BAE9-E166F1AB3495}" type="datetimeFigureOut">
               <a:rPr lang="en-GB" smtClean="0"/>
-              <a:t>06/01/2017</a:t>
+              <a:t>09/01/2017</a:t>
             </a:fld>
             <a:endParaRPr lang="en-GB"/>
           </a:p>
@@ -413,7 +414,7 @@
           <a:p>
             <a:fld id="{771DAF8F-959D-484A-BAE9-E166F1AB3495}" type="datetimeFigureOut">
               <a:rPr lang="en-GB" smtClean="0"/>
-              <a:t>06/01/2017</a:t>
+              <a:t>09/01/2017</a:t>
             </a:fld>
             <a:endParaRPr lang="en-GB"/>
           </a:p>
@@ -593,7 +594,7 @@
           <a:p>
             <a:fld id="{771DAF8F-959D-484A-BAE9-E166F1AB3495}" type="datetimeFigureOut">
               <a:rPr lang="en-GB" smtClean="0"/>
-              <a:t>06/01/2017</a:t>
+              <a:t>09/01/2017</a:t>
             </a:fld>
             <a:endParaRPr lang="en-GB"/>
           </a:p>
@@ -763,7 +764,7 @@
           <a:p>
             <a:fld id="{771DAF8F-959D-484A-BAE9-E166F1AB3495}" type="datetimeFigureOut">
               <a:rPr lang="en-GB" smtClean="0"/>
-              <a:t>06/01/2017</a:t>
+              <a:t>09/01/2017</a:t>
             </a:fld>
             <a:endParaRPr lang="en-GB"/>
           </a:p>
@@ -1009,7 +1010,7 @@
           <a:p>
             <a:fld id="{771DAF8F-959D-484A-BAE9-E166F1AB3495}" type="datetimeFigureOut">
               <a:rPr lang="en-GB" smtClean="0"/>
-              <a:t>06/01/2017</a:t>
+              <a:t>09/01/2017</a:t>
             </a:fld>
             <a:endParaRPr lang="en-GB"/>
           </a:p>
@@ -1241,7 +1242,7 @@
           <a:p>
             <a:fld id="{771DAF8F-959D-484A-BAE9-E166F1AB3495}" type="datetimeFigureOut">
               <a:rPr lang="en-GB" smtClean="0"/>
-              <a:t>06/01/2017</a:t>
+              <a:t>09/01/2017</a:t>
             </a:fld>
             <a:endParaRPr lang="en-GB"/>
           </a:p>
@@ -1608,7 +1609,7 @@
           <a:p>
             <a:fld id="{771DAF8F-959D-484A-BAE9-E166F1AB3495}" type="datetimeFigureOut">
               <a:rPr lang="en-GB" smtClean="0"/>
-              <a:t>06/01/2017</a:t>
+              <a:t>09/01/2017</a:t>
             </a:fld>
             <a:endParaRPr lang="en-GB"/>
           </a:p>
@@ -1726,7 +1727,7 @@
           <a:p>
             <a:fld id="{771DAF8F-959D-484A-BAE9-E166F1AB3495}" type="datetimeFigureOut">
               <a:rPr lang="en-GB" smtClean="0"/>
-              <a:t>06/01/2017</a:t>
+              <a:t>09/01/2017</a:t>
             </a:fld>
             <a:endParaRPr lang="en-GB"/>
           </a:p>
@@ -1821,7 +1822,7 @@
           <a:p>
             <a:fld id="{771DAF8F-959D-484A-BAE9-E166F1AB3495}" type="datetimeFigureOut">
               <a:rPr lang="en-GB" smtClean="0"/>
-              <a:t>06/01/2017</a:t>
+              <a:t>09/01/2017</a:t>
             </a:fld>
             <a:endParaRPr lang="en-GB"/>
           </a:p>
@@ -2098,7 +2099,7 @@
           <a:p>
             <a:fld id="{771DAF8F-959D-484A-BAE9-E166F1AB3495}" type="datetimeFigureOut">
               <a:rPr lang="en-GB" smtClean="0"/>
-              <a:t>06/01/2017</a:t>
+              <a:t>09/01/2017</a:t>
             </a:fld>
             <a:endParaRPr lang="en-GB"/>
           </a:p>
@@ -2351,7 +2352,7 @@
           <a:p>
             <a:fld id="{771DAF8F-959D-484A-BAE9-E166F1AB3495}" type="datetimeFigureOut">
               <a:rPr lang="en-GB" smtClean="0"/>
-              <a:t>06/01/2017</a:t>
+              <a:t>09/01/2017</a:t>
             </a:fld>
             <a:endParaRPr lang="en-GB"/>
           </a:p>
@@ -2564,7 +2565,7 @@
           <a:p>
             <a:fld id="{771DAF8F-959D-484A-BAE9-E166F1AB3495}" type="datetimeFigureOut">
               <a:rPr lang="en-GB" smtClean="0"/>
-              <a:t>06/01/2017</a:t>
+              <a:t>09/01/2017</a:t>
             </a:fld>
             <a:endParaRPr lang="en-GB"/>
           </a:p>
@@ -3780,6 +3781,1293 @@
 </p:sld>
 </file>
 
+<file path=ppt/slides/slide2.xml><?xml version="1.0" encoding="utf-8"?>
+<p:sld xmlns:a="http://schemas.openxmlformats.org/drawingml/2006/main" xmlns:r="http://schemas.openxmlformats.org/officeDocument/2006/relationships" xmlns:p="http://schemas.openxmlformats.org/presentationml/2006/main">
+  <p:cSld>
+    <p:spTree>
+      <p:nvGrpSpPr>
+        <p:cNvPr id="1" name=""/>
+        <p:cNvGrpSpPr/>
+        <p:nvPr/>
+      </p:nvGrpSpPr>
+      <p:grpSpPr>
+        <a:xfrm>
+          <a:off x="0" y="0"/>
+          <a:ext cx="0" cy="0"/>
+          <a:chOff x="0" y="0"/>
+          <a:chExt cx="0" cy="0"/>
+        </a:xfrm>
+      </p:grpSpPr>
+      <p:sp>
+        <p:nvSpPr>
+          <p:cNvPr id="6" name="Snip Single Corner Rectangle 5"/>
+          <p:cNvSpPr/>
+          <p:nvPr/>
+        </p:nvSpPr>
+        <p:spPr>
+          <a:xfrm>
+            <a:off x="581886" y="2612570"/>
+            <a:ext cx="2090057" cy="1573481"/>
+          </a:xfrm>
+          <a:prstGeom prst="snip1Rect">
+            <a:avLst/>
+          </a:prstGeom>
+          <a:solidFill>
+            <a:srgbClr val="F1FEE7">
+              <a:alpha val="50196"/>
+            </a:srgbClr>
+          </a:solidFill>
+          <a:ln w="57150">
+            <a:solidFill>
+              <a:schemeClr val="accent6">
+                <a:lumMod val="60000"/>
+                <a:lumOff val="40000"/>
+              </a:schemeClr>
+            </a:solidFill>
+          </a:ln>
+        </p:spPr>
+        <p:style>
+          <a:lnRef idx="1">
+            <a:schemeClr val="accent4"/>
+          </a:lnRef>
+          <a:fillRef idx="2">
+            <a:schemeClr val="accent4"/>
+          </a:fillRef>
+          <a:effectRef idx="1">
+            <a:schemeClr val="accent4"/>
+          </a:effectRef>
+          <a:fontRef idx="minor">
+            <a:schemeClr val="dk1"/>
+          </a:fontRef>
+        </p:style>
+        <p:txBody>
+          <a:bodyPr rtlCol="0" anchor="ctr"/>
+          <a:lstStyle/>
+          <a:p>
+            <a:pPr algn="ctr"/>
+            <a:r>
+              <a:rPr lang="en-GB" sz="2400" b="1" dirty="0" smtClean="0"/>
+              <a:t>View 1</a:t>
+            </a:r>
+          </a:p>
+          <a:p>
+            <a:pPr algn="ctr"/>
+            <a:endParaRPr lang="en-GB" sz="2000" b="1" dirty="0"/>
+          </a:p>
+          <a:p>
+            <a:pPr algn="ctr"/>
+            <a:r>
+              <a:rPr lang="en-GB" sz="2000" dirty="0" smtClean="0"/>
+              <a:t>Year</a:t>
+            </a:r>
+            <a:br>
+              <a:rPr lang="en-GB" sz="2000" dirty="0" smtClean="0"/>
+            </a:br>
+            <a:r>
+              <a:rPr lang="en-GB" sz="2000" dirty="0" smtClean="0"/>
+              <a:t>OVERVIEW</a:t>
+            </a:r>
+            <a:endParaRPr lang="en-GB" sz="2000" dirty="0"/>
+          </a:p>
+        </p:txBody>
+      </p:sp>
+      <p:sp>
+        <p:nvSpPr>
+          <p:cNvPr id="9" name="Snip Single Corner Rectangle 8"/>
+          <p:cNvSpPr/>
+          <p:nvPr/>
+        </p:nvSpPr>
+        <p:spPr>
+          <a:xfrm>
+            <a:off x="3592285" y="2612571"/>
+            <a:ext cx="2090057" cy="1573481"/>
+          </a:xfrm>
+          <a:prstGeom prst="snip1Rect">
+            <a:avLst/>
+          </a:prstGeom>
+          <a:solidFill>
+            <a:srgbClr val="F1FEE7">
+              <a:alpha val="50196"/>
+            </a:srgbClr>
+          </a:solidFill>
+          <a:ln w="57150">
+            <a:solidFill>
+              <a:schemeClr val="accent6">
+                <a:lumMod val="60000"/>
+                <a:lumOff val="40000"/>
+              </a:schemeClr>
+            </a:solidFill>
+          </a:ln>
+        </p:spPr>
+        <p:style>
+          <a:lnRef idx="1">
+            <a:schemeClr val="accent4"/>
+          </a:lnRef>
+          <a:fillRef idx="2">
+            <a:schemeClr val="accent4"/>
+          </a:fillRef>
+          <a:effectRef idx="1">
+            <a:schemeClr val="accent4"/>
+          </a:effectRef>
+          <a:fontRef idx="minor">
+            <a:schemeClr val="dk1"/>
+          </a:fontRef>
+        </p:style>
+        <p:txBody>
+          <a:bodyPr rtlCol="0" anchor="ctr"/>
+          <a:lstStyle/>
+          <a:p>
+            <a:pPr algn="ctr"/>
+            <a:r>
+              <a:rPr lang="en-GB" sz="2400" b="1" dirty="0" smtClean="0"/>
+              <a:t>View 2</a:t>
+            </a:r>
+          </a:p>
+          <a:p>
+            <a:pPr algn="ctr"/>
+            <a:endParaRPr lang="en-GB" sz="2000" b="1" dirty="0"/>
+          </a:p>
+          <a:p>
+            <a:pPr algn="ctr"/>
+            <a:r>
+              <a:rPr lang="en-GB" sz="2000" dirty="0" smtClean="0"/>
+              <a:t>Month</a:t>
+            </a:r>
+            <a:br>
+              <a:rPr lang="en-GB" sz="2000" dirty="0" smtClean="0"/>
+            </a:br>
+            <a:r>
+              <a:rPr lang="en-GB" sz="2000" dirty="0" smtClean="0"/>
+              <a:t>OVERVIEW</a:t>
+            </a:r>
+            <a:endParaRPr lang="en-GB" sz="2000" dirty="0"/>
+          </a:p>
+        </p:txBody>
+      </p:sp>
+      <p:sp>
+        <p:nvSpPr>
+          <p:cNvPr id="35" name="Snip Single Corner Rectangle 34"/>
+          <p:cNvSpPr/>
+          <p:nvPr/>
+        </p:nvSpPr>
+        <p:spPr>
+          <a:xfrm>
+            <a:off x="6602684" y="2612570"/>
+            <a:ext cx="2090057" cy="1573481"/>
+          </a:xfrm>
+          <a:prstGeom prst="snip1Rect">
+            <a:avLst/>
+          </a:prstGeom>
+          <a:solidFill>
+            <a:srgbClr val="F1FEE7">
+              <a:alpha val="50196"/>
+            </a:srgbClr>
+          </a:solidFill>
+          <a:ln w="57150">
+            <a:solidFill>
+              <a:schemeClr val="accent6">
+                <a:lumMod val="60000"/>
+                <a:lumOff val="40000"/>
+              </a:schemeClr>
+            </a:solidFill>
+          </a:ln>
+        </p:spPr>
+        <p:style>
+          <a:lnRef idx="1">
+            <a:schemeClr val="accent4"/>
+          </a:lnRef>
+          <a:fillRef idx="2">
+            <a:schemeClr val="accent4"/>
+          </a:fillRef>
+          <a:effectRef idx="1">
+            <a:schemeClr val="accent4"/>
+          </a:effectRef>
+          <a:fontRef idx="minor">
+            <a:schemeClr val="dk1"/>
+          </a:fontRef>
+        </p:style>
+        <p:txBody>
+          <a:bodyPr rtlCol="0" anchor="ctr"/>
+          <a:lstStyle/>
+          <a:p>
+            <a:pPr algn="ctr"/>
+            <a:r>
+              <a:rPr lang="en-GB" sz="2400" b="1" dirty="0" smtClean="0"/>
+              <a:t>View 5</a:t>
+            </a:r>
+          </a:p>
+          <a:p>
+            <a:pPr algn="ctr"/>
+            <a:endParaRPr lang="en-GB" sz="2000" b="1" dirty="0"/>
+          </a:p>
+          <a:p>
+            <a:pPr algn="ctr"/>
+            <a:r>
+              <a:rPr lang="en-GB" sz="2000" dirty="0" smtClean="0"/>
+              <a:t>Fin. Transactions</a:t>
+            </a:r>
+            <a:br>
+              <a:rPr lang="en-GB" sz="2000" dirty="0" smtClean="0"/>
+            </a:br>
+            <a:r>
+              <a:rPr lang="en-GB" sz="2000" dirty="0" smtClean="0"/>
+              <a:t>OVERVIEW</a:t>
+            </a:r>
+            <a:endParaRPr lang="en-GB" sz="2000" dirty="0"/>
+          </a:p>
+        </p:txBody>
+      </p:sp>
+      <p:sp>
+        <p:nvSpPr>
+          <p:cNvPr id="61" name="Snip Single Corner Rectangle 60"/>
+          <p:cNvSpPr/>
+          <p:nvPr/>
+        </p:nvSpPr>
+        <p:spPr>
+          <a:xfrm>
+            <a:off x="3592285" y="166257"/>
+            <a:ext cx="2090057" cy="1573481"/>
+          </a:xfrm>
+          <a:prstGeom prst="snip1Rect">
+            <a:avLst/>
+          </a:prstGeom>
+          <a:solidFill>
+            <a:srgbClr val="E5F2FF">
+              <a:alpha val="50196"/>
+            </a:srgbClr>
+          </a:solidFill>
+          <a:ln w="57150">
+            <a:solidFill>
+              <a:schemeClr val="accent5">
+                <a:lumMod val="60000"/>
+                <a:lumOff val="40000"/>
+              </a:schemeClr>
+            </a:solidFill>
+          </a:ln>
+        </p:spPr>
+        <p:style>
+          <a:lnRef idx="1">
+            <a:schemeClr val="accent4"/>
+          </a:lnRef>
+          <a:fillRef idx="2">
+            <a:schemeClr val="accent4"/>
+          </a:fillRef>
+          <a:effectRef idx="1">
+            <a:schemeClr val="accent4"/>
+          </a:effectRef>
+          <a:fontRef idx="minor">
+            <a:schemeClr val="dk1"/>
+          </a:fontRef>
+        </p:style>
+        <p:txBody>
+          <a:bodyPr rtlCol="0" anchor="ctr"/>
+          <a:lstStyle/>
+          <a:p>
+            <a:pPr algn="ctr"/>
+            <a:r>
+              <a:rPr lang="en-GB" sz="2400" b="1" dirty="0" smtClean="0"/>
+              <a:t>View 3</a:t>
+            </a:r>
+          </a:p>
+          <a:p>
+            <a:pPr algn="ctr"/>
+            <a:endParaRPr lang="en-GB" sz="2000" b="1" dirty="0"/>
+          </a:p>
+          <a:p>
+            <a:pPr algn="ctr"/>
+            <a:r>
+              <a:rPr lang="en-GB" sz="2000" dirty="0" smtClean="0"/>
+              <a:t>Month/Year</a:t>
+            </a:r>
+            <a:br>
+              <a:rPr lang="en-GB" sz="2000" dirty="0" smtClean="0"/>
+            </a:br>
+            <a:r>
+              <a:rPr lang="en-GB" sz="2000" dirty="0" smtClean="0"/>
+              <a:t>SELECTION</a:t>
+            </a:r>
+            <a:endParaRPr lang="en-GB" sz="2000" dirty="0"/>
+          </a:p>
+        </p:txBody>
+      </p:sp>
+      <p:sp>
+        <p:nvSpPr>
+          <p:cNvPr id="66" name="Snip Single Corner Rectangle 65"/>
+          <p:cNvSpPr/>
+          <p:nvPr/>
+        </p:nvSpPr>
+        <p:spPr>
+          <a:xfrm>
+            <a:off x="9613083" y="2612570"/>
+            <a:ext cx="2090057" cy="1573481"/>
+          </a:xfrm>
+          <a:prstGeom prst="snip1Rect">
+            <a:avLst/>
+          </a:prstGeom>
+          <a:solidFill>
+            <a:srgbClr val="F1FEE7">
+              <a:alpha val="50196"/>
+            </a:srgbClr>
+          </a:solidFill>
+          <a:ln w="57150">
+            <a:solidFill>
+              <a:schemeClr val="accent6">
+                <a:lumMod val="60000"/>
+                <a:lumOff val="40000"/>
+              </a:schemeClr>
+            </a:solidFill>
+          </a:ln>
+        </p:spPr>
+        <p:style>
+          <a:lnRef idx="1">
+            <a:schemeClr val="accent4"/>
+          </a:lnRef>
+          <a:fillRef idx="2">
+            <a:schemeClr val="accent4"/>
+          </a:fillRef>
+          <a:effectRef idx="1">
+            <a:schemeClr val="accent4"/>
+          </a:effectRef>
+          <a:fontRef idx="minor">
+            <a:schemeClr val="dk1"/>
+          </a:fontRef>
+        </p:style>
+        <p:txBody>
+          <a:bodyPr rtlCol="0" anchor="ctr"/>
+          <a:lstStyle/>
+          <a:p>
+            <a:pPr algn="ctr"/>
+            <a:r>
+              <a:rPr lang="en-GB" sz="2400" b="1" dirty="0" smtClean="0"/>
+              <a:t>View 6</a:t>
+            </a:r>
+          </a:p>
+          <a:p>
+            <a:pPr algn="ctr"/>
+            <a:endParaRPr lang="en-GB" sz="2000" b="1" dirty="0"/>
+          </a:p>
+          <a:p>
+            <a:pPr algn="ctr"/>
+            <a:r>
+              <a:rPr lang="en-GB" sz="2000" dirty="0" smtClean="0"/>
+              <a:t>Fin. Transaction</a:t>
+            </a:r>
+            <a:br>
+              <a:rPr lang="en-GB" sz="2000" dirty="0" smtClean="0"/>
+            </a:br>
+            <a:r>
+              <a:rPr lang="en-GB" sz="2000" dirty="0" smtClean="0"/>
+              <a:t>DETAILS</a:t>
+            </a:r>
+            <a:endParaRPr lang="en-GB" sz="2000" dirty="0"/>
+          </a:p>
+        </p:txBody>
+      </p:sp>
+      <p:sp>
+        <p:nvSpPr>
+          <p:cNvPr id="67" name="Snip Single Corner Rectangle 66"/>
+          <p:cNvSpPr/>
+          <p:nvPr/>
+        </p:nvSpPr>
+        <p:spPr>
+          <a:xfrm>
+            <a:off x="3592285" y="5058885"/>
+            <a:ext cx="2090057" cy="1573481"/>
+          </a:xfrm>
+          <a:prstGeom prst="snip1Rect">
+            <a:avLst/>
+          </a:prstGeom>
+          <a:solidFill>
+            <a:srgbClr val="E5F2FF">
+              <a:alpha val="50196"/>
+            </a:srgbClr>
+          </a:solidFill>
+          <a:ln w="57150">
+            <a:solidFill>
+              <a:schemeClr val="accent5">
+                <a:lumMod val="60000"/>
+                <a:lumOff val="40000"/>
+              </a:schemeClr>
+            </a:solidFill>
+          </a:ln>
+        </p:spPr>
+        <p:style>
+          <a:lnRef idx="1">
+            <a:schemeClr val="accent4"/>
+          </a:lnRef>
+          <a:fillRef idx="2">
+            <a:schemeClr val="accent4"/>
+          </a:fillRef>
+          <a:effectRef idx="1">
+            <a:schemeClr val="accent4"/>
+          </a:effectRef>
+          <a:fontRef idx="minor">
+            <a:schemeClr val="dk1"/>
+          </a:fontRef>
+        </p:style>
+        <p:txBody>
+          <a:bodyPr rtlCol="0" anchor="ctr"/>
+          <a:lstStyle/>
+          <a:p>
+            <a:pPr algn="ctr"/>
+            <a:r>
+              <a:rPr lang="en-GB" sz="2400" b="1" dirty="0" smtClean="0"/>
+              <a:t>View 4</a:t>
+            </a:r>
+          </a:p>
+          <a:p>
+            <a:pPr algn="ctr"/>
+            <a:endParaRPr lang="en-GB" sz="2000" b="1" dirty="0"/>
+          </a:p>
+          <a:p>
+            <a:pPr algn="ctr"/>
+            <a:r>
+              <a:rPr lang="en-GB" sz="2000" dirty="0" smtClean="0"/>
+              <a:t>Categories</a:t>
+            </a:r>
+            <a:br>
+              <a:rPr lang="en-GB" sz="2000" dirty="0" smtClean="0"/>
+            </a:br>
+            <a:r>
+              <a:rPr lang="en-GB" sz="2000" dirty="0" smtClean="0"/>
+              <a:t>FILTERING</a:t>
+            </a:r>
+            <a:endParaRPr lang="en-GB" sz="2000" dirty="0"/>
+          </a:p>
+        </p:txBody>
+      </p:sp>
+      <p:cxnSp>
+        <p:nvCxnSpPr>
+          <p:cNvPr id="69" name="Straight Arrow Connector 68"/>
+          <p:cNvCxnSpPr>
+            <a:stCxn id="35" idx="0"/>
+            <a:endCxn id="66" idx="2"/>
+          </p:cNvCxnSpPr>
+          <p:nvPr/>
+        </p:nvCxnSpPr>
+        <p:spPr>
+          <a:xfrm>
+            <a:off x="8692741" y="3399311"/>
+            <a:ext cx="920342" cy="0"/>
+          </a:xfrm>
+          <a:prstGeom prst="straightConnector1">
+            <a:avLst/>
+          </a:prstGeom>
+          <a:ln w="57150">
+            <a:solidFill>
+              <a:srgbClr val="00B050"/>
+            </a:solidFill>
+            <a:tailEnd type="triangle"/>
+          </a:ln>
+        </p:spPr>
+        <p:style>
+          <a:lnRef idx="1">
+            <a:schemeClr val="accent1"/>
+          </a:lnRef>
+          <a:fillRef idx="0">
+            <a:schemeClr val="accent1"/>
+          </a:fillRef>
+          <a:effectRef idx="0">
+            <a:schemeClr val="accent1"/>
+          </a:effectRef>
+          <a:fontRef idx="minor">
+            <a:schemeClr val="tx1"/>
+          </a:fontRef>
+        </p:style>
+      </p:cxnSp>
+      <p:cxnSp>
+        <p:nvCxnSpPr>
+          <p:cNvPr id="77" name="Straight Arrow Connector 76"/>
+          <p:cNvCxnSpPr>
+            <a:stCxn id="61" idx="2"/>
+            <a:endCxn id="6" idx="3"/>
+          </p:cNvCxnSpPr>
+          <p:nvPr/>
+        </p:nvCxnSpPr>
+        <p:spPr>
+          <a:xfrm rot="10800000" flipV="1">
+            <a:off x="1626915" y="952998"/>
+            <a:ext cx="1965370" cy="1659572"/>
+          </a:xfrm>
+          <a:prstGeom prst="bentConnector2">
+            <a:avLst/>
+          </a:prstGeom>
+          <a:ln w="57150">
+            <a:solidFill>
+              <a:srgbClr val="00B050"/>
+            </a:solidFill>
+            <a:headEnd type="none" w="med" len="med"/>
+            <a:tailEnd type="triangle" w="med" len="med"/>
+          </a:ln>
+        </p:spPr>
+        <p:style>
+          <a:lnRef idx="1">
+            <a:schemeClr val="accent1"/>
+          </a:lnRef>
+          <a:fillRef idx="0">
+            <a:schemeClr val="accent1"/>
+          </a:fillRef>
+          <a:effectRef idx="0">
+            <a:schemeClr val="accent1"/>
+          </a:effectRef>
+          <a:fontRef idx="minor">
+            <a:schemeClr val="tx1"/>
+          </a:fontRef>
+        </p:style>
+      </p:cxnSp>
+      <p:cxnSp>
+        <p:nvCxnSpPr>
+          <p:cNvPr id="92" name="Straight Arrow Connector 91"/>
+          <p:cNvCxnSpPr>
+            <a:stCxn id="61" idx="0"/>
+            <a:endCxn id="35" idx="3"/>
+          </p:cNvCxnSpPr>
+          <p:nvPr/>
+        </p:nvCxnSpPr>
+        <p:spPr>
+          <a:xfrm>
+            <a:off x="5682342" y="952998"/>
+            <a:ext cx="1965371" cy="1659572"/>
+          </a:xfrm>
+          <a:prstGeom prst="bentConnector2">
+            <a:avLst/>
+          </a:prstGeom>
+          <a:ln w="57150">
+            <a:solidFill>
+              <a:srgbClr val="00B050"/>
+            </a:solidFill>
+            <a:prstDash val="solid"/>
+            <a:headEnd type="none" w="med" len="med"/>
+            <a:tailEnd type="triangle" w="med" len="med"/>
+          </a:ln>
+        </p:spPr>
+        <p:style>
+          <a:lnRef idx="1">
+            <a:schemeClr val="accent1"/>
+          </a:lnRef>
+          <a:fillRef idx="0">
+            <a:schemeClr val="accent1"/>
+          </a:fillRef>
+          <a:effectRef idx="0">
+            <a:schemeClr val="accent1"/>
+          </a:effectRef>
+          <a:fontRef idx="minor">
+            <a:schemeClr val="tx1"/>
+          </a:fontRef>
+        </p:style>
+      </p:cxnSp>
+      <p:cxnSp>
+        <p:nvCxnSpPr>
+          <p:cNvPr id="95" name="Straight Arrow Connector 94"/>
+          <p:cNvCxnSpPr>
+            <a:stCxn id="61" idx="1"/>
+            <a:endCxn id="9" idx="3"/>
+          </p:cNvCxnSpPr>
+          <p:nvPr/>
+        </p:nvCxnSpPr>
+        <p:spPr>
+          <a:xfrm>
+            <a:off x="4637314" y="1739738"/>
+            <a:ext cx="0" cy="872833"/>
+          </a:xfrm>
+          <a:prstGeom prst="straightConnector1">
+            <a:avLst/>
+          </a:prstGeom>
+          <a:ln w="57150">
+            <a:solidFill>
+              <a:srgbClr val="00B050"/>
+            </a:solidFill>
+            <a:headEnd type="none" w="med" len="med"/>
+            <a:tailEnd type="triangle" w="med" len="med"/>
+          </a:ln>
+        </p:spPr>
+        <p:style>
+          <a:lnRef idx="1">
+            <a:schemeClr val="accent1"/>
+          </a:lnRef>
+          <a:fillRef idx="0">
+            <a:schemeClr val="accent1"/>
+          </a:fillRef>
+          <a:effectRef idx="0">
+            <a:schemeClr val="accent1"/>
+          </a:effectRef>
+          <a:fontRef idx="minor">
+            <a:schemeClr val="tx1"/>
+          </a:fontRef>
+        </p:style>
+      </p:cxnSp>
+      <p:cxnSp>
+        <p:nvCxnSpPr>
+          <p:cNvPr id="98" name="Straight Arrow Connector 97"/>
+          <p:cNvCxnSpPr>
+            <a:stCxn id="67" idx="3"/>
+          </p:cNvCxnSpPr>
+          <p:nvPr/>
+        </p:nvCxnSpPr>
+        <p:spPr>
+          <a:xfrm flipH="1" flipV="1">
+            <a:off x="4637313" y="4186051"/>
+            <a:ext cx="1" cy="872834"/>
+          </a:xfrm>
+          <a:prstGeom prst="straightConnector1">
+            <a:avLst/>
+          </a:prstGeom>
+          <a:ln w="57150">
+            <a:solidFill>
+              <a:srgbClr val="00B050"/>
+            </a:solidFill>
+            <a:headEnd type="none" w="med" len="med"/>
+            <a:tailEnd type="triangle" w="med" len="med"/>
+          </a:ln>
+        </p:spPr>
+        <p:style>
+          <a:lnRef idx="1">
+            <a:schemeClr val="accent1"/>
+          </a:lnRef>
+          <a:fillRef idx="0">
+            <a:schemeClr val="accent1"/>
+          </a:fillRef>
+          <a:effectRef idx="0">
+            <a:schemeClr val="accent1"/>
+          </a:effectRef>
+          <a:fontRef idx="minor">
+            <a:schemeClr val="tx1"/>
+          </a:fontRef>
+        </p:style>
+      </p:cxnSp>
+      <p:cxnSp>
+        <p:nvCxnSpPr>
+          <p:cNvPr id="101" name="Straight Arrow Connector 100"/>
+          <p:cNvCxnSpPr>
+            <a:stCxn id="67" idx="2"/>
+            <a:endCxn id="6" idx="1"/>
+          </p:cNvCxnSpPr>
+          <p:nvPr/>
+        </p:nvCxnSpPr>
+        <p:spPr>
+          <a:xfrm rot="10800000">
+            <a:off x="1626915" y="4186052"/>
+            <a:ext cx="1965370" cy="1659575"/>
+          </a:xfrm>
+          <a:prstGeom prst="bentConnector2">
+            <a:avLst/>
+          </a:prstGeom>
+          <a:ln w="57150">
+            <a:solidFill>
+              <a:srgbClr val="00B050"/>
+            </a:solidFill>
+            <a:headEnd type="none" w="med" len="med"/>
+            <a:tailEnd type="triangle" w="med" len="med"/>
+          </a:ln>
+        </p:spPr>
+        <p:style>
+          <a:lnRef idx="1">
+            <a:schemeClr val="accent1"/>
+          </a:lnRef>
+          <a:fillRef idx="0">
+            <a:schemeClr val="accent1"/>
+          </a:fillRef>
+          <a:effectRef idx="0">
+            <a:schemeClr val="accent1"/>
+          </a:effectRef>
+          <a:fontRef idx="minor">
+            <a:schemeClr val="tx1"/>
+          </a:fontRef>
+        </p:style>
+      </p:cxnSp>
+      <p:cxnSp>
+        <p:nvCxnSpPr>
+          <p:cNvPr id="104" name="Straight Arrow Connector 103"/>
+          <p:cNvCxnSpPr>
+            <a:stCxn id="67" idx="0"/>
+            <a:endCxn id="35" idx="1"/>
+          </p:cNvCxnSpPr>
+          <p:nvPr/>
+        </p:nvCxnSpPr>
+        <p:spPr>
+          <a:xfrm flipV="1">
+            <a:off x="5682342" y="4186051"/>
+            <a:ext cx="1965371" cy="1659575"/>
+          </a:xfrm>
+          <a:prstGeom prst="bentConnector2">
+            <a:avLst/>
+          </a:prstGeom>
+          <a:ln w="57150">
+            <a:solidFill>
+              <a:srgbClr val="00B050"/>
+            </a:solidFill>
+            <a:prstDash val="solid"/>
+            <a:headEnd type="none" w="med" len="med"/>
+            <a:tailEnd type="triangle" w="med" len="med"/>
+          </a:ln>
+        </p:spPr>
+        <p:style>
+          <a:lnRef idx="1">
+            <a:schemeClr val="accent1"/>
+          </a:lnRef>
+          <a:fillRef idx="0">
+            <a:schemeClr val="accent1"/>
+          </a:fillRef>
+          <a:effectRef idx="0">
+            <a:schemeClr val="accent1"/>
+          </a:effectRef>
+          <a:fontRef idx="minor">
+            <a:schemeClr val="tx1"/>
+          </a:fontRef>
+        </p:style>
+      </p:cxnSp>
+      <p:cxnSp>
+        <p:nvCxnSpPr>
+          <p:cNvPr id="107" name="Straight Arrow Connector 106"/>
+          <p:cNvCxnSpPr>
+            <a:stCxn id="6" idx="0"/>
+            <a:endCxn id="9" idx="2"/>
+          </p:cNvCxnSpPr>
+          <p:nvPr/>
+        </p:nvCxnSpPr>
+        <p:spPr>
+          <a:xfrm>
+            <a:off x="2671943" y="3399311"/>
+            <a:ext cx="920342" cy="1"/>
+          </a:xfrm>
+          <a:prstGeom prst="straightConnector1">
+            <a:avLst/>
+          </a:prstGeom>
+          <a:ln w="57150">
+            <a:solidFill>
+              <a:schemeClr val="accent2"/>
+            </a:solidFill>
+            <a:headEnd type="none" w="med" len="med"/>
+            <a:tailEnd type="triangle" w="med" len="med"/>
+          </a:ln>
+        </p:spPr>
+        <p:style>
+          <a:lnRef idx="1">
+            <a:schemeClr val="accent1"/>
+          </a:lnRef>
+          <a:fillRef idx="0">
+            <a:schemeClr val="accent1"/>
+          </a:fillRef>
+          <a:effectRef idx="0">
+            <a:schemeClr val="accent1"/>
+          </a:effectRef>
+          <a:fontRef idx="minor">
+            <a:schemeClr val="tx1"/>
+          </a:fontRef>
+        </p:style>
+      </p:cxnSp>
+      <p:cxnSp>
+        <p:nvCxnSpPr>
+          <p:cNvPr id="113" name="Straight Arrow Connector 112"/>
+          <p:cNvCxnSpPr>
+            <a:stCxn id="9" idx="0"/>
+            <a:endCxn id="35" idx="2"/>
+          </p:cNvCxnSpPr>
+          <p:nvPr/>
+        </p:nvCxnSpPr>
+        <p:spPr>
+          <a:xfrm flipV="1">
+            <a:off x="5682342" y="3399311"/>
+            <a:ext cx="920342" cy="1"/>
+          </a:xfrm>
+          <a:prstGeom prst="straightConnector1">
+            <a:avLst/>
+          </a:prstGeom>
+          <a:ln w="57150">
+            <a:solidFill>
+              <a:schemeClr val="accent2"/>
+            </a:solidFill>
+            <a:headEnd type="none" w="med" len="med"/>
+            <a:tailEnd type="triangle" w="med" len="med"/>
+          </a:ln>
+        </p:spPr>
+        <p:style>
+          <a:lnRef idx="1">
+            <a:schemeClr val="accent1"/>
+          </a:lnRef>
+          <a:fillRef idx="0">
+            <a:schemeClr val="accent1"/>
+          </a:fillRef>
+          <a:effectRef idx="0">
+            <a:schemeClr val="accent1"/>
+          </a:effectRef>
+          <a:fontRef idx="minor">
+            <a:schemeClr val="tx1"/>
+          </a:fontRef>
+        </p:style>
+      </p:cxnSp>
+      <p:sp>
+        <p:nvSpPr>
+          <p:cNvPr id="2" name="Rectangle 1"/>
+          <p:cNvSpPr/>
+          <p:nvPr/>
+        </p:nvSpPr>
+        <p:spPr>
+          <a:xfrm>
+            <a:off x="7076060" y="859454"/>
+            <a:ext cx="535724" cy="923330"/>
+          </a:xfrm>
+          <a:prstGeom prst="rect">
+            <a:avLst/>
+          </a:prstGeom>
+          <a:noFill/>
+        </p:spPr>
+        <p:txBody>
+          <a:bodyPr wrap="none" lIns="91440" tIns="45720" rIns="91440" bIns="45720">
+            <a:spAutoFit/>
+          </a:bodyPr>
+          <a:lstStyle/>
+          <a:p>
+            <a:pPr algn="ctr"/>
+            <a:r>
+              <a:rPr lang="de-CH" sz="5400" b="1" dirty="0">
+                <a:ln w="22225">
+                  <a:solidFill>
+                    <a:schemeClr val="tx1"/>
+                  </a:solidFill>
+                  <a:prstDash val="solid"/>
+                </a:ln>
+                <a:solidFill>
+                  <a:srgbClr val="FFC000"/>
+                </a:solidFill>
+              </a:rPr>
+              <a:t>3</a:t>
+            </a:r>
+            <a:endParaRPr lang="de-CH" sz="5400" b="1" dirty="0">
+              <a:ln w="22225">
+                <a:solidFill>
+                  <a:schemeClr val="tx1"/>
+                </a:solidFill>
+                <a:prstDash val="solid"/>
+              </a:ln>
+              <a:solidFill>
+                <a:srgbClr val="FFC000"/>
+              </a:solidFill>
+            </a:endParaRPr>
+          </a:p>
+        </p:txBody>
+      </p:sp>
+      <p:sp>
+        <p:nvSpPr>
+          <p:cNvPr id="20" name="Rectangle 19"/>
+          <p:cNvSpPr/>
+          <p:nvPr/>
+        </p:nvSpPr>
+        <p:spPr>
+          <a:xfrm>
+            <a:off x="4637313" y="1603148"/>
+            <a:ext cx="535724" cy="923330"/>
+          </a:xfrm>
+          <a:prstGeom prst="rect">
+            <a:avLst/>
+          </a:prstGeom>
+          <a:noFill/>
+        </p:spPr>
+        <p:txBody>
+          <a:bodyPr wrap="none" lIns="91440" tIns="45720" rIns="91440" bIns="45720">
+            <a:spAutoFit/>
+          </a:bodyPr>
+          <a:lstStyle/>
+          <a:p>
+            <a:pPr algn="ctr"/>
+            <a:r>
+              <a:rPr lang="de-CH" sz="5400" b="1" dirty="0">
+                <a:ln w="22225">
+                  <a:solidFill>
+                    <a:schemeClr val="tx1"/>
+                  </a:solidFill>
+                  <a:prstDash val="solid"/>
+                </a:ln>
+                <a:solidFill>
+                  <a:srgbClr val="FFC000"/>
+                </a:solidFill>
+              </a:rPr>
+              <a:t>2</a:t>
+            </a:r>
+            <a:endParaRPr lang="de-CH" sz="5400" b="1" dirty="0">
+              <a:ln w="22225">
+                <a:solidFill>
+                  <a:schemeClr val="tx1"/>
+                </a:solidFill>
+                <a:prstDash val="solid"/>
+              </a:ln>
+              <a:solidFill>
+                <a:srgbClr val="FFC000"/>
+              </a:solidFill>
+            </a:endParaRPr>
+          </a:p>
+        </p:txBody>
+      </p:sp>
+      <p:sp>
+        <p:nvSpPr>
+          <p:cNvPr id="21" name="Rectangle 20"/>
+          <p:cNvSpPr/>
+          <p:nvPr/>
+        </p:nvSpPr>
+        <p:spPr>
+          <a:xfrm>
+            <a:off x="1662843" y="822349"/>
+            <a:ext cx="535724" cy="923330"/>
+          </a:xfrm>
+          <a:prstGeom prst="rect">
+            <a:avLst/>
+          </a:prstGeom>
+          <a:noFill/>
+        </p:spPr>
+        <p:txBody>
+          <a:bodyPr wrap="none" lIns="91440" tIns="45720" rIns="91440" bIns="45720">
+            <a:spAutoFit/>
+          </a:bodyPr>
+          <a:lstStyle/>
+          <a:p>
+            <a:pPr algn="ctr"/>
+            <a:r>
+              <a:rPr lang="de-CH" sz="5400" b="1" dirty="0" smtClean="0">
+                <a:ln w="22225">
+                  <a:solidFill>
+                    <a:schemeClr val="tx1"/>
+                  </a:solidFill>
+                  <a:prstDash val="solid"/>
+                </a:ln>
+                <a:solidFill>
+                  <a:srgbClr val="FFC000"/>
+                </a:solidFill>
+              </a:rPr>
+              <a:t>1</a:t>
+            </a:r>
+            <a:endParaRPr lang="de-CH" sz="5400" b="1" dirty="0">
+              <a:ln w="22225">
+                <a:solidFill>
+                  <a:schemeClr val="tx1"/>
+                </a:solidFill>
+                <a:prstDash val="solid"/>
+              </a:ln>
+              <a:solidFill>
+                <a:srgbClr val="FFC000"/>
+              </a:solidFill>
+            </a:endParaRPr>
+          </a:p>
+        </p:txBody>
+      </p:sp>
+      <p:sp>
+        <p:nvSpPr>
+          <p:cNvPr id="22" name="Rectangle 21"/>
+          <p:cNvSpPr/>
+          <p:nvPr/>
+        </p:nvSpPr>
+        <p:spPr>
+          <a:xfrm>
+            <a:off x="2788699" y="2475980"/>
+            <a:ext cx="535724" cy="923330"/>
+          </a:xfrm>
+          <a:prstGeom prst="rect">
+            <a:avLst/>
+          </a:prstGeom>
+          <a:noFill/>
+        </p:spPr>
+        <p:txBody>
+          <a:bodyPr wrap="none" lIns="91440" tIns="45720" rIns="91440" bIns="45720">
+            <a:spAutoFit/>
+          </a:bodyPr>
+          <a:lstStyle/>
+          <a:p>
+            <a:pPr algn="ctr"/>
+            <a:r>
+              <a:rPr lang="de-CH" sz="5400" b="1" dirty="0">
+                <a:ln w="22225">
+                  <a:solidFill>
+                    <a:schemeClr val="tx1"/>
+                  </a:solidFill>
+                  <a:prstDash val="solid"/>
+                </a:ln>
+                <a:solidFill>
+                  <a:srgbClr val="FFC000"/>
+                </a:solidFill>
+              </a:rPr>
+              <a:t>4</a:t>
+            </a:r>
+            <a:endParaRPr lang="de-CH" sz="5400" b="1" dirty="0">
+              <a:ln w="22225">
+                <a:solidFill>
+                  <a:schemeClr val="tx1"/>
+                </a:solidFill>
+                <a:prstDash val="solid"/>
+              </a:ln>
+              <a:solidFill>
+                <a:srgbClr val="FFC000"/>
+              </a:solidFill>
+            </a:endParaRPr>
+          </a:p>
+        </p:txBody>
+      </p:sp>
+      <p:sp>
+        <p:nvSpPr>
+          <p:cNvPr id="23" name="Rectangle 22"/>
+          <p:cNvSpPr/>
+          <p:nvPr/>
+        </p:nvSpPr>
+        <p:spPr>
+          <a:xfrm>
+            <a:off x="5812308" y="2475980"/>
+            <a:ext cx="535724" cy="923330"/>
+          </a:xfrm>
+          <a:prstGeom prst="rect">
+            <a:avLst/>
+          </a:prstGeom>
+          <a:noFill/>
+        </p:spPr>
+        <p:txBody>
+          <a:bodyPr wrap="none" lIns="91440" tIns="45720" rIns="91440" bIns="45720">
+            <a:spAutoFit/>
+          </a:bodyPr>
+          <a:lstStyle/>
+          <a:p>
+            <a:pPr algn="ctr"/>
+            <a:r>
+              <a:rPr lang="de-CH" sz="5400" b="1" dirty="0" smtClean="0">
+                <a:ln w="22225">
+                  <a:solidFill>
+                    <a:schemeClr val="tx1"/>
+                  </a:solidFill>
+                  <a:prstDash val="solid"/>
+                </a:ln>
+                <a:solidFill>
+                  <a:srgbClr val="FFC000"/>
+                </a:solidFill>
+              </a:rPr>
+              <a:t>5</a:t>
+            </a:r>
+            <a:endParaRPr lang="de-CH" sz="5400" b="1" dirty="0">
+              <a:ln w="22225">
+                <a:solidFill>
+                  <a:schemeClr val="tx1"/>
+                </a:solidFill>
+                <a:prstDash val="solid"/>
+              </a:ln>
+              <a:solidFill>
+                <a:srgbClr val="FFC000"/>
+              </a:solidFill>
+            </a:endParaRPr>
+          </a:p>
+        </p:txBody>
+      </p:sp>
+      <p:sp>
+        <p:nvSpPr>
+          <p:cNvPr id="24" name="Rectangle 23"/>
+          <p:cNvSpPr/>
+          <p:nvPr/>
+        </p:nvSpPr>
+        <p:spPr>
+          <a:xfrm>
+            <a:off x="1749617" y="4972791"/>
+            <a:ext cx="535724" cy="923330"/>
+          </a:xfrm>
+          <a:prstGeom prst="rect">
+            <a:avLst/>
+          </a:prstGeom>
+          <a:noFill/>
+        </p:spPr>
+        <p:txBody>
+          <a:bodyPr wrap="none" lIns="91440" tIns="45720" rIns="91440" bIns="45720">
+            <a:spAutoFit/>
+          </a:bodyPr>
+          <a:lstStyle/>
+          <a:p>
+            <a:pPr algn="ctr"/>
+            <a:r>
+              <a:rPr lang="de-CH" sz="5400" b="1" dirty="0">
+                <a:ln w="22225">
+                  <a:solidFill>
+                    <a:schemeClr val="tx1"/>
+                  </a:solidFill>
+                  <a:prstDash val="solid"/>
+                </a:ln>
+                <a:solidFill>
+                  <a:srgbClr val="FFC000"/>
+                </a:solidFill>
+              </a:rPr>
+              <a:t>6</a:t>
+            </a:r>
+            <a:endParaRPr lang="de-CH" sz="5400" b="1" dirty="0">
+              <a:ln w="22225">
+                <a:solidFill>
+                  <a:schemeClr val="tx1"/>
+                </a:solidFill>
+                <a:prstDash val="solid"/>
+              </a:ln>
+              <a:solidFill>
+                <a:srgbClr val="FFC000"/>
+              </a:solidFill>
+            </a:endParaRPr>
+          </a:p>
+        </p:txBody>
+      </p:sp>
+      <p:sp>
+        <p:nvSpPr>
+          <p:cNvPr id="26" name="Rectangle 25"/>
+          <p:cNvSpPr/>
+          <p:nvPr/>
+        </p:nvSpPr>
+        <p:spPr>
+          <a:xfrm>
+            <a:off x="4686447" y="4160804"/>
+            <a:ext cx="535724" cy="923330"/>
+          </a:xfrm>
+          <a:prstGeom prst="rect">
+            <a:avLst/>
+          </a:prstGeom>
+          <a:noFill/>
+        </p:spPr>
+        <p:txBody>
+          <a:bodyPr wrap="none" lIns="91440" tIns="45720" rIns="91440" bIns="45720">
+            <a:spAutoFit/>
+          </a:bodyPr>
+          <a:lstStyle/>
+          <a:p>
+            <a:pPr algn="ctr"/>
+            <a:r>
+              <a:rPr lang="de-CH" sz="5400" b="1" dirty="0" smtClean="0">
+                <a:ln w="22225">
+                  <a:solidFill>
+                    <a:schemeClr val="tx1"/>
+                  </a:solidFill>
+                  <a:prstDash val="solid"/>
+                </a:ln>
+                <a:solidFill>
+                  <a:srgbClr val="FFC000"/>
+                </a:solidFill>
+              </a:rPr>
+              <a:t>7</a:t>
+            </a:r>
+            <a:endParaRPr lang="de-CH" sz="5400" b="1" dirty="0">
+              <a:ln w="22225">
+                <a:solidFill>
+                  <a:schemeClr val="tx1"/>
+                </a:solidFill>
+                <a:prstDash val="solid"/>
+              </a:ln>
+              <a:solidFill>
+                <a:srgbClr val="FFC000"/>
+              </a:solidFill>
+            </a:endParaRPr>
+          </a:p>
+        </p:txBody>
+      </p:sp>
+      <p:sp>
+        <p:nvSpPr>
+          <p:cNvPr id="28" name="Rectangle 27"/>
+          <p:cNvSpPr/>
+          <p:nvPr/>
+        </p:nvSpPr>
+        <p:spPr>
+          <a:xfrm>
+            <a:off x="8810834" y="2475980"/>
+            <a:ext cx="535724" cy="923330"/>
+          </a:xfrm>
+          <a:prstGeom prst="rect">
+            <a:avLst/>
+          </a:prstGeom>
+          <a:noFill/>
+        </p:spPr>
+        <p:txBody>
+          <a:bodyPr wrap="none" lIns="91440" tIns="45720" rIns="91440" bIns="45720">
+            <a:spAutoFit/>
+          </a:bodyPr>
+          <a:lstStyle/>
+          <a:p>
+            <a:pPr algn="ctr"/>
+            <a:r>
+              <a:rPr lang="de-CH" sz="5400" b="1" dirty="0">
+                <a:ln w="22225">
+                  <a:solidFill>
+                    <a:schemeClr val="tx1"/>
+                  </a:solidFill>
+                  <a:prstDash val="solid"/>
+                </a:ln>
+                <a:solidFill>
+                  <a:srgbClr val="FFC000"/>
+                </a:solidFill>
+              </a:rPr>
+              <a:t>9</a:t>
+            </a:r>
+            <a:endParaRPr lang="de-CH" sz="5400" b="1" dirty="0">
+              <a:ln w="22225">
+                <a:solidFill>
+                  <a:schemeClr val="tx1"/>
+                </a:solidFill>
+                <a:prstDash val="solid"/>
+              </a:ln>
+              <a:solidFill>
+                <a:srgbClr val="FFC000"/>
+              </a:solidFill>
+            </a:endParaRPr>
+          </a:p>
+        </p:txBody>
+      </p:sp>
+      <p:sp>
+        <p:nvSpPr>
+          <p:cNvPr id="29" name="Rectangle 28"/>
+          <p:cNvSpPr/>
+          <p:nvPr/>
+        </p:nvSpPr>
+        <p:spPr>
+          <a:xfrm>
+            <a:off x="7044366" y="4972790"/>
+            <a:ext cx="535724" cy="923330"/>
+          </a:xfrm>
+          <a:prstGeom prst="rect">
+            <a:avLst/>
+          </a:prstGeom>
+          <a:noFill/>
+        </p:spPr>
+        <p:txBody>
+          <a:bodyPr wrap="none" lIns="91440" tIns="45720" rIns="91440" bIns="45720">
+            <a:spAutoFit/>
+          </a:bodyPr>
+          <a:lstStyle/>
+          <a:p>
+            <a:pPr algn="ctr"/>
+            <a:r>
+              <a:rPr lang="de-CH" sz="5400" b="1" dirty="0" smtClean="0">
+                <a:ln w="22225">
+                  <a:solidFill>
+                    <a:schemeClr val="tx1"/>
+                  </a:solidFill>
+                  <a:prstDash val="solid"/>
+                </a:ln>
+                <a:solidFill>
+                  <a:srgbClr val="FFC000"/>
+                </a:solidFill>
+              </a:rPr>
+              <a:t>8</a:t>
+            </a:r>
+            <a:endParaRPr lang="de-CH" sz="5400" b="1" dirty="0">
+              <a:ln w="22225">
+                <a:solidFill>
+                  <a:schemeClr val="tx1"/>
+                </a:solidFill>
+                <a:prstDash val="solid"/>
+              </a:ln>
+              <a:solidFill>
+                <a:srgbClr val="FFC000"/>
+              </a:solidFill>
+            </a:endParaRPr>
+          </a:p>
+        </p:txBody>
+      </p:sp>
+    </p:spTree>
+    <p:extLst>
+      <p:ext uri="{BB962C8B-B14F-4D97-AF65-F5344CB8AC3E}">
+        <p14:creationId xmlns:p14="http://schemas.microsoft.com/office/powerpoint/2010/main" val="989246417"/>
+      </p:ext>
+    </p:extLst>
+  </p:cSld>
+  <p:clrMapOvr>
+    <a:masterClrMapping/>
+  </p:clrMapOvr>
+</p:sld>
+</file>
+
 <file path=ppt/theme/theme1.xml><?xml version="1.0" encoding="utf-8"?>
 <a:theme xmlns:a="http://schemas.openxmlformats.org/drawingml/2006/main" name="Office Theme">
   <a:themeElements>

</xml_diff>

<commit_message>
update pictures based on new findings from development phase
</commit_message>
<xml_diff>
--- a/03_Figures/07_Suggestion/NavigationMap.pptx
+++ b/03_Figures/07_Suggestion/NavigationMap.pptx
@@ -244,7 +244,7 @@
           <a:p>
             <a:fld id="{771DAF8F-959D-484A-BAE9-E166F1AB3495}" type="datetimeFigureOut">
               <a:rPr lang="en-GB" smtClean="0"/>
-              <a:t>09/01/2017</a:t>
+              <a:t>21/01/2017</a:t>
             </a:fld>
             <a:endParaRPr lang="en-GB"/>
           </a:p>
@@ -414,7 +414,7 @@
           <a:p>
             <a:fld id="{771DAF8F-959D-484A-BAE9-E166F1AB3495}" type="datetimeFigureOut">
               <a:rPr lang="en-GB" smtClean="0"/>
-              <a:t>09/01/2017</a:t>
+              <a:t>21/01/2017</a:t>
             </a:fld>
             <a:endParaRPr lang="en-GB"/>
           </a:p>
@@ -594,7 +594,7 @@
           <a:p>
             <a:fld id="{771DAF8F-959D-484A-BAE9-E166F1AB3495}" type="datetimeFigureOut">
               <a:rPr lang="en-GB" smtClean="0"/>
-              <a:t>09/01/2017</a:t>
+              <a:t>21/01/2017</a:t>
             </a:fld>
             <a:endParaRPr lang="en-GB"/>
           </a:p>
@@ -764,7 +764,7 @@
           <a:p>
             <a:fld id="{771DAF8F-959D-484A-BAE9-E166F1AB3495}" type="datetimeFigureOut">
               <a:rPr lang="en-GB" smtClean="0"/>
-              <a:t>09/01/2017</a:t>
+              <a:t>21/01/2017</a:t>
             </a:fld>
             <a:endParaRPr lang="en-GB"/>
           </a:p>
@@ -1010,7 +1010,7 @@
           <a:p>
             <a:fld id="{771DAF8F-959D-484A-BAE9-E166F1AB3495}" type="datetimeFigureOut">
               <a:rPr lang="en-GB" smtClean="0"/>
-              <a:t>09/01/2017</a:t>
+              <a:t>21/01/2017</a:t>
             </a:fld>
             <a:endParaRPr lang="en-GB"/>
           </a:p>
@@ -1242,7 +1242,7 @@
           <a:p>
             <a:fld id="{771DAF8F-959D-484A-BAE9-E166F1AB3495}" type="datetimeFigureOut">
               <a:rPr lang="en-GB" smtClean="0"/>
-              <a:t>09/01/2017</a:t>
+              <a:t>21/01/2017</a:t>
             </a:fld>
             <a:endParaRPr lang="en-GB"/>
           </a:p>
@@ -1609,7 +1609,7 @@
           <a:p>
             <a:fld id="{771DAF8F-959D-484A-BAE9-E166F1AB3495}" type="datetimeFigureOut">
               <a:rPr lang="en-GB" smtClean="0"/>
-              <a:t>09/01/2017</a:t>
+              <a:t>21/01/2017</a:t>
             </a:fld>
             <a:endParaRPr lang="en-GB"/>
           </a:p>
@@ -1727,7 +1727,7 @@
           <a:p>
             <a:fld id="{771DAF8F-959D-484A-BAE9-E166F1AB3495}" type="datetimeFigureOut">
               <a:rPr lang="en-GB" smtClean="0"/>
-              <a:t>09/01/2017</a:t>
+              <a:t>21/01/2017</a:t>
             </a:fld>
             <a:endParaRPr lang="en-GB"/>
           </a:p>
@@ -1822,7 +1822,7 @@
           <a:p>
             <a:fld id="{771DAF8F-959D-484A-BAE9-E166F1AB3495}" type="datetimeFigureOut">
               <a:rPr lang="en-GB" smtClean="0"/>
-              <a:t>09/01/2017</a:t>
+              <a:t>21/01/2017</a:t>
             </a:fld>
             <a:endParaRPr lang="en-GB"/>
           </a:p>
@@ -2099,7 +2099,7 @@
           <a:p>
             <a:fld id="{771DAF8F-959D-484A-BAE9-E166F1AB3495}" type="datetimeFigureOut">
               <a:rPr lang="en-GB" smtClean="0"/>
-              <a:t>09/01/2017</a:t>
+              <a:t>21/01/2017</a:t>
             </a:fld>
             <a:endParaRPr lang="en-GB"/>
           </a:p>
@@ -2352,7 +2352,7 @@
           <a:p>
             <a:fld id="{771DAF8F-959D-484A-BAE9-E166F1AB3495}" type="datetimeFigureOut">
               <a:rPr lang="en-GB" smtClean="0"/>
-              <a:t>09/01/2017</a:t>
+              <a:t>21/01/2017</a:t>
             </a:fld>
             <a:endParaRPr lang="en-GB"/>
           </a:p>
@@ -2565,7 +2565,7 @@
           <a:p>
             <a:fld id="{771DAF8F-959D-484A-BAE9-E166F1AB3495}" type="datetimeFigureOut">
               <a:rPr lang="en-GB" smtClean="0"/>
-              <a:t>09/01/2017</a:t>
+              <a:t>21/01/2017</a:t>
             </a:fld>
             <a:endParaRPr lang="en-GB"/>
           </a:p>
@@ -3249,7 +3249,7 @@
             <a:pPr algn="ctr"/>
             <a:r>
               <a:rPr lang="en-GB" sz="2000" dirty="0" smtClean="0"/>
-              <a:t>Month/Year</a:t>
+              <a:t>Year</a:t>
             </a:r>
             <a:br>
               <a:rPr lang="en-GB" sz="2000" dirty="0" smtClean="0"/>
@@ -3466,49 +3466,8 @@
           </a:prstGeom>
           <a:ln w="57150">
             <a:solidFill>
-              <a:srgbClr val="00B050"/>
+              <a:schemeClr val="accent5"/>
             </a:solidFill>
-            <a:headEnd type="none" w="med" len="med"/>
-            <a:tailEnd type="triangle" w="med" len="med"/>
-          </a:ln>
-        </p:spPr>
-        <p:style>
-          <a:lnRef idx="1">
-            <a:schemeClr val="accent1"/>
-          </a:lnRef>
-          <a:fillRef idx="0">
-            <a:schemeClr val="accent1"/>
-          </a:fillRef>
-          <a:effectRef idx="0">
-            <a:schemeClr val="accent1"/>
-          </a:effectRef>
-          <a:fontRef idx="minor">
-            <a:schemeClr val="tx1"/>
-          </a:fontRef>
-        </p:style>
-      </p:cxnSp>
-      <p:cxnSp>
-        <p:nvCxnSpPr>
-          <p:cNvPr id="92" name="Straight Arrow Connector 91"/>
-          <p:cNvCxnSpPr>
-            <a:stCxn id="61" idx="0"/>
-            <a:endCxn id="35" idx="3"/>
-          </p:cNvCxnSpPr>
-          <p:nvPr/>
-        </p:nvCxnSpPr>
-        <p:spPr>
-          <a:xfrm>
-            <a:off x="5682342" y="952998"/>
-            <a:ext cx="1965371" cy="1659572"/>
-          </a:xfrm>
-          <a:prstGeom prst="bentConnector2">
-            <a:avLst/>
-          </a:prstGeom>
-          <a:ln w="57150">
-            <a:solidFill>
-              <a:srgbClr val="00B050"/>
-            </a:solidFill>
-            <a:prstDash val="solid"/>
             <a:headEnd type="none" w="med" len="med"/>
             <a:tailEnd type="triangle" w="med" len="med"/>
           </a:ln>
@@ -3547,7 +3506,7 @@
           </a:prstGeom>
           <a:ln w="57150">
             <a:solidFill>
-              <a:srgbClr val="00B050"/>
+              <a:schemeClr val="accent5"/>
             </a:solidFill>
             <a:headEnd type="none" w="med" len="med"/>
             <a:tailEnd type="triangle" w="med" len="med"/>
@@ -3586,7 +3545,7 @@
           </a:prstGeom>
           <a:ln w="57150">
             <a:solidFill>
-              <a:srgbClr val="00B050"/>
+              <a:schemeClr val="accent5"/>
             </a:solidFill>
             <a:headEnd type="none" w="med" len="med"/>
             <a:tailEnd type="triangle" w="med" len="med"/>
@@ -3626,7 +3585,7 @@
           </a:prstGeom>
           <a:ln w="57150">
             <a:solidFill>
-              <a:srgbClr val="00B050"/>
+              <a:schemeClr val="accent5"/>
             </a:solidFill>
             <a:headEnd type="none" w="med" len="med"/>
             <a:tailEnd type="triangle" w="med" len="med"/>
@@ -3666,7 +3625,7 @@
           </a:prstGeom>
           <a:ln w="57150">
             <a:solidFill>
-              <a:srgbClr val="00B050"/>
+              <a:schemeClr val="accent5"/>
             </a:solidFill>
             <a:prstDash val="solid"/>
             <a:headEnd type="none" w="med" len="med"/>
@@ -3707,7 +3666,7 @@
           </a:prstGeom>
           <a:ln w="57150">
             <a:solidFill>
-              <a:schemeClr val="accent2"/>
+              <a:srgbClr val="00B050"/>
             </a:solidFill>
             <a:headEnd type="none" w="med" len="med"/>
             <a:tailEnd type="triangle" w="med" len="med"/>
@@ -3747,7 +3706,7 @@
           </a:prstGeom>
           <a:ln w="57150">
             <a:solidFill>
-              <a:schemeClr val="accent2"/>
+              <a:srgbClr val="00B050"/>
             </a:solidFill>
             <a:headEnd type="none" w="med" len="med"/>
             <a:tailEnd type="triangle" w="med" len="med"/>
@@ -4077,7 +4036,7 @@
             <a:pPr algn="ctr"/>
             <a:r>
               <a:rPr lang="en-GB" sz="2000" dirty="0" smtClean="0"/>
-              <a:t>Month/Year</a:t>
+              <a:t>Year</a:t>
             </a:r>
             <a:br>
               <a:rPr lang="en-GB" sz="2000" dirty="0" smtClean="0"/>
@@ -4294,49 +4253,8 @@
           </a:prstGeom>
           <a:ln w="57150">
             <a:solidFill>
-              <a:srgbClr val="00B050"/>
+              <a:schemeClr val="accent5"/>
             </a:solidFill>
-            <a:headEnd type="none" w="med" len="med"/>
-            <a:tailEnd type="triangle" w="med" len="med"/>
-          </a:ln>
-        </p:spPr>
-        <p:style>
-          <a:lnRef idx="1">
-            <a:schemeClr val="accent1"/>
-          </a:lnRef>
-          <a:fillRef idx="0">
-            <a:schemeClr val="accent1"/>
-          </a:fillRef>
-          <a:effectRef idx="0">
-            <a:schemeClr val="accent1"/>
-          </a:effectRef>
-          <a:fontRef idx="minor">
-            <a:schemeClr val="tx1"/>
-          </a:fontRef>
-        </p:style>
-      </p:cxnSp>
-      <p:cxnSp>
-        <p:nvCxnSpPr>
-          <p:cNvPr id="92" name="Straight Arrow Connector 91"/>
-          <p:cNvCxnSpPr>
-            <a:stCxn id="61" idx="0"/>
-            <a:endCxn id="35" idx="3"/>
-          </p:cNvCxnSpPr>
-          <p:nvPr/>
-        </p:nvCxnSpPr>
-        <p:spPr>
-          <a:xfrm>
-            <a:off x="5682342" y="952998"/>
-            <a:ext cx="1965371" cy="1659572"/>
-          </a:xfrm>
-          <a:prstGeom prst="bentConnector2">
-            <a:avLst/>
-          </a:prstGeom>
-          <a:ln w="57150">
-            <a:solidFill>
-              <a:srgbClr val="00B050"/>
-            </a:solidFill>
-            <a:prstDash val="solid"/>
             <a:headEnd type="none" w="med" len="med"/>
             <a:tailEnd type="triangle" w="med" len="med"/>
           </a:ln>
@@ -4375,7 +4293,7 @@
           </a:prstGeom>
           <a:ln w="57150">
             <a:solidFill>
-              <a:srgbClr val="00B050"/>
+              <a:schemeClr val="accent5"/>
             </a:solidFill>
             <a:headEnd type="none" w="med" len="med"/>
             <a:tailEnd type="triangle" w="med" len="med"/>
@@ -4414,7 +4332,7 @@
           </a:prstGeom>
           <a:ln w="57150">
             <a:solidFill>
-              <a:srgbClr val="00B050"/>
+              <a:schemeClr val="accent5"/>
             </a:solidFill>
             <a:headEnd type="none" w="med" len="med"/>
             <a:tailEnd type="triangle" w="med" len="med"/>
@@ -4454,7 +4372,7 @@
           </a:prstGeom>
           <a:ln w="57150">
             <a:solidFill>
-              <a:srgbClr val="00B050"/>
+              <a:schemeClr val="accent5"/>
             </a:solidFill>
             <a:headEnd type="none" w="med" len="med"/>
             <a:tailEnd type="triangle" w="med" len="med"/>
@@ -4494,7 +4412,7 @@
           </a:prstGeom>
           <a:ln w="57150">
             <a:solidFill>
-              <a:srgbClr val="00B050"/>
+              <a:schemeClr val="accent5"/>
             </a:solidFill>
             <a:prstDash val="solid"/>
             <a:headEnd type="none" w="med" len="med"/>
@@ -4535,7 +4453,7 @@
           </a:prstGeom>
           <a:ln w="57150">
             <a:solidFill>
-              <a:schemeClr val="accent2"/>
+              <a:srgbClr val="00B050"/>
             </a:solidFill>
             <a:headEnd type="none" w="med" len="med"/>
             <a:tailEnd type="triangle" w="med" len="med"/>
@@ -4575,7 +4493,7 @@
           </a:prstGeom>
           <a:ln w="57150">
             <a:solidFill>
-              <a:schemeClr val="accent2"/>
+              <a:srgbClr val="00B050"/>
             </a:solidFill>
             <a:headEnd type="none" w="med" len="med"/>
             <a:tailEnd type="triangle" w="med" len="med"/>
@@ -4598,57 +4516,6 @@
       </p:cxnSp>
       <p:sp>
         <p:nvSpPr>
-          <p:cNvPr id="2" name="Rectangle 1"/>
-          <p:cNvSpPr/>
-          <p:nvPr/>
-        </p:nvSpPr>
-        <p:spPr>
-          <a:xfrm>
-            <a:off x="7076060" y="859454"/>
-            <a:ext cx="535724" cy="923330"/>
-          </a:xfrm>
-          <a:prstGeom prst="rect">
-            <a:avLst/>
-          </a:prstGeom>
-          <a:noFill/>
-        </p:spPr>
-        <p:txBody>
-          <a:bodyPr wrap="none" lIns="91440" tIns="45720" rIns="91440" bIns="45720">
-            <a:spAutoFit/>
-          </a:bodyPr>
-          <a:lstStyle/>
-          <a:p>
-            <a:pPr algn="ctr"/>
-            <a:r>
-              <a:rPr lang="de-CH" sz="5400" b="1" dirty="0">
-                <a:ln w="22225">
-                  <a:solidFill>
-                    <a:schemeClr val="tx1"/>
-                  </a:solidFill>
-                  <a:prstDash val="solid"/>
-                </a:ln>
-                <a:solidFill>
-                  <a:srgbClr val="FFC000"/>
-                </a:solidFill>
-              </a:rPr>
-              <a:t>3</a:t>
-            </a:r>
-            <a:endParaRPr lang="de-CH" sz="5400" b="1" dirty="0">
-              <a:ln w="22225">
-                <a:solidFill>
-                  <a:schemeClr val="tx1"/>
-                </a:solidFill>
-                <a:prstDash val="solid"/>
-              </a:ln>
-              <a:solidFill>
-                <a:srgbClr val="FFC000"/>
-              </a:solidFill>
-            </a:endParaRPr>
-          </a:p>
-        </p:txBody>
-      </p:sp>
-      <p:sp>
-        <p:nvSpPr>
           <p:cNvPr id="20" name="Rectangle 19"/>
           <p:cNvSpPr/>
           <p:nvPr/>
@@ -4684,17 +4551,6 @@
               </a:rPr>
               <a:t>2</a:t>
             </a:r>
-            <a:endParaRPr lang="de-CH" sz="5400" b="1" dirty="0">
-              <a:ln w="22225">
-                <a:solidFill>
-                  <a:schemeClr val="tx1"/>
-                </a:solidFill>
-                <a:prstDash val="solid"/>
-              </a:ln>
-              <a:solidFill>
-                <a:srgbClr val="FFC000"/>
-              </a:solidFill>
-            </a:endParaRPr>
           </a:p>
         </p:txBody>
       </p:sp>
@@ -4773,7 +4629,58 @@
           <a:p>
             <a:pPr algn="ctr"/>
             <a:r>
-              <a:rPr lang="de-CH" sz="5400" b="1" dirty="0">
+              <a:rPr lang="en-GB" sz="5400" b="1" dirty="0">
+                <a:ln w="22225">
+                  <a:solidFill>
+                    <a:schemeClr val="tx1"/>
+                  </a:solidFill>
+                  <a:prstDash val="solid"/>
+                </a:ln>
+                <a:solidFill>
+                  <a:srgbClr val="FFC000"/>
+                </a:solidFill>
+              </a:rPr>
+              <a:t>3</a:t>
+            </a:r>
+            <a:endParaRPr lang="de-CH" sz="5400" b="1" dirty="0">
+              <a:ln w="22225">
+                <a:solidFill>
+                  <a:schemeClr val="tx1"/>
+                </a:solidFill>
+                <a:prstDash val="solid"/>
+              </a:ln>
+              <a:solidFill>
+                <a:srgbClr val="FFC000"/>
+              </a:solidFill>
+            </a:endParaRPr>
+          </a:p>
+        </p:txBody>
+      </p:sp>
+      <p:sp>
+        <p:nvSpPr>
+          <p:cNvPr id="23" name="Rectangle 22"/>
+          <p:cNvSpPr/>
+          <p:nvPr/>
+        </p:nvSpPr>
+        <p:spPr>
+          <a:xfrm>
+            <a:off x="5812308" y="2475980"/>
+            <a:ext cx="535724" cy="923330"/>
+          </a:xfrm>
+          <a:prstGeom prst="rect">
+            <a:avLst/>
+          </a:prstGeom>
+          <a:noFill/>
+        </p:spPr>
+        <p:txBody>
+          <a:bodyPr wrap="none" lIns="91440" tIns="45720" rIns="91440" bIns="45720">
+            <a:spAutoFit/>
+          </a:bodyPr>
+          <a:lstStyle/>
+          <a:p>
+            <a:pPr algn="ctr"/>
+            <a:r>
+              <a:rPr lang="en-GB" sz="5400" b="1" dirty="0">
                 <a:ln w="22225">
                   <a:solidFill>
                     <a:schemeClr val="tx1"/>
@@ -4802,13 +4709,13 @@
       </p:sp>
       <p:sp>
         <p:nvSpPr>
-          <p:cNvPr id="23" name="Rectangle 22"/>
+          <p:cNvPr id="24" name="Rectangle 23"/>
           <p:cNvSpPr/>
           <p:nvPr/>
         </p:nvSpPr>
         <p:spPr>
           <a:xfrm>
-            <a:off x="5812308" y="2475980"/>
+            <a:off x="1749617" y="4972791"/>
             <a:ext cx="535724" cy="923330"/>
           </a:xfrm>
           <a:prstGeom prst="rect">
@@ -4824,7 +4731,7 @@
           <a:p>
             <a:pPr algn="ctr"/>
             <a:r>
-              <a:rPr lang="de-CH" sz="5400" b="1" dirty="0" smtClean="0">
+              <a:rPr lang="en-GB" sz="5400" b="1" dirty="0">
                 <a:ln w="22225">
                   <a:solidFill>
                     <a:schemeClr val="tx1"/>
@@ -4853,13 +4760,13 @@
       </p:sp>
       <p:sp>
         <p:nvSpPr>
-          <p:cNvPr id="24" name="Rectangle 23"/>
+          <p:cNvPr id="26" name="Rectangle 25"/>
           <p:cNvSpPr/>
           <p:nvPr/>
         </p:nvSpPr>
         <p:spPr>
           <a:xfrm>
-            <a:off x="1749617" y="4972791"/>
+            <a:off x="4686447" y="4160804"/>
             <a:ext cx="535724" cy="923330"/>
           </a:xfrm>
           <a:prstGeom prst="rect">
@@ -4875,7 +4782,7 @@
           <a:p>
             <a:pPr algn="ctr"/>
             <a:r>
-              <a:rPr lang="de-CH" sz="5400" b="1" dirty="0">
+              <a:rPr lang="en-GB" sz="5400" b="1" dirty="0">
                 <a:ln w="22225">
                   <a:solidFill>
                     <a:schemeClr val="tx1"/>
@@ -4904,13 +4811,13 @@
       </p:sp>
       <p:sp>
         <p:nvSpPr>
-          <p:cNvPr id="26" name="Rectangle 25"/>
+          <p:cNvPr id="28" name="Rectangle 27"/>
           <p:cNvSpPr/>
           <p:nvPr/>
         </p:nvSpPr>
         <p:spPr>
           <a:xfrm>
-            <a:off x="4686447" y="4160804"/>
+            <a:off x="8810834" y="2475980"/>
             <a:ext cx="535724" cy="923330"/>
           </a:xfrm>
           <a:prstGeom prst="rect">
@@ -4926,7 +4833,58 @@
           <a:p>
             <a:pPr algn="ctr"/>
             <a:r>
-              <a:rPr lang="de-CH" sz="5400" b="1" dirty="0" smtClean="0">
+              <a:rPr lang="en-GB" sz="5400" b="1" dirty="0">
+                <a:ln w="22225">
+                  <a:solidFill>
+                    <a:schemeClr val="tx1"/>
+                  </a:solidFill>
+                  <a:prstDash val="solid"/>
+                </a:ln>
+                <a:solidFill>
+                  <a:srgbClr val="FFC000"/>
+                </a:solidFill>
+              </a:rPr>
+              <a:t>8</a:t>
+            </a:r>
+            <a:endParaRPr lang="de-CH" sz="5400" b="1" dirty="0">
+              <a:ln w="22225">
+                <a:solidFill>
+                  <a:schemeClr val="tx1"/>
+                </a:solidFill>
+                <a:prstDash val="solid"/>
+              </a:ln>
+              <a:solidFill>
+                <a:srgbClr val="FFC000"/>
+              </a:solidFill>
+            </a:endParaRPr>
+          </a:p>
+        </p:txBody>
+      </p:sp>
+      <p:sp>
+        <p:nvSpPr>
+          <p:cNvPr id="29" name="Rectangle 28"/>
+          <p:cNvSpPr/>
+          <p:nvPr/>
+        </p:nvSpPr>
+        <p:spPr>
+          <a:xfrm>
+            <a:off x="7044366" y="4972790"/>
+            <a:ext cx="535724" cy="923330"/>
+          </a:xfrm>
+          <a:prstGeom prst="rect">
+            <a:avLst/>
+          </a:prstGeom>
+          <a:noFill/>
+        </p:spPr>
+        <p:txBody>
+          <a:bodyPr wrap="none" lIns="91440" tIns="45720" rIns="91440" bIns="45720">
+            <a:spAutoFit/>
+          </a:bodyPr>
+          <a:lstStyle/>
+          <a:p>
+            <a:pPr algn="ctr"/>
+            <a:r>
+              <a:rPr lang="en-GB" sz="5400" b="1" dirty="0">
                 <a:ln w="22225">
                   <a:solidFill>
                     <a:schemeClr val="tx1"/>
@@ -4938,108 +4896,6 @@
                 </a:solidFill>
               </a:rPr>
               <a:t>7</a:t>
-            </a:r>
-            <a:endParaRPr lang="de-CH" sz="5400" b="1" dirty="0">
-              <a:ln w="22225">
-                <a:solidFill>
-                  <a:schemeClr val="tx1"/>
-                </a:solidFill>
-                <a:prstDash val="solid"/>
-              </a:ln>
-              <a:solidFill>
-                <a:srgbClr val="FFC000"/>
-              </a:solidFill>
-            </a:endParaRPr>
-          </a:p>
-        </p:txBody>
-      </p:sp>
-      <p:sp>
-        <p:nvSpPr>
-          <p:cNvPr id="28" name="Rectangle 27"/>
-          <p:cNvSpPr/>
-          <p:nvPr/>
-        </p:nvSpPr>
-        <p:spPr>
-          <a:xfrm>
-            <a:off x="8810834" y="2475980"/>
-            <a:ext cx="535724" cy="923330"/>
-          </a:xfrm>
-          <a:prstGeom prst="rect">
-            <a:avLst/>
-          </a:prstGeom>
-          <a:noFill/>
-        </p:spPr>
-        <p:txBody>
-          <a:bodyPr wrap="none" lIns="91440" tIns="45720" rIns="91440" bIns="45720">
-            <a:spAutoFit/>
-          </a:bodyPr>
-          <a:lstStyle/>
-          <a:p>
-            <a:pPr algn="ctr"/>
-            <a:r>
-              <a:rPr lang="de-CH" sz="5400" b="1" dirty="0">
-                <a:ln w="22225">
-                  <a:solidFill>
-                    <a:schemeClr val="tx1"/>
-                  </a:solidFill>
-                  <a:prstDash val="solid"/>
-                </a:ln>
-                <a:solidFill>
-                  <a:srgbClr val="FFC000"/>
-                </a:solidFill>
-              </a:rPr>
-              <a:t>9</a:t>
-            </a:r>
-            <a:endParaRPr lang="de-CH" sz="5400" b="1" dirty="0">
-              <a:ln w="22225">
-                <a:solidFill>
-                  <a:schemeClr val="tx1"/>
-                </a:solidFill>
-                <a:prstDash val="solid"/>
-              </a:ln>
-              <a:solidFill>
-                <a:srgbClr val="FFC000"/>
-              </a:solidFill>
-            </a:endParaRPr>
-          </a:p>
-        </p:txBody>
-      </p:sp>
-      <p:sp>
-        <p:nvSpPr>
-          <p:cNvPr id="29" name="Rectangle 28"/>
-          <p:cNvSpPr/>
-          <p:nvPr/>
-        </p:nvSpPr>
-        <p:spPr>
-          <a:xfrm>
-            <a:off x="7044366" y="4972790"/>
-            <a:ext cx="535724" cy="923330"/>
-          </a:xfrm>
-          <a:prstGeom prst="rect">
-            <a:avLst/>
-          </a:prstGeom>
-          <a:noFill/>
-        </p:spPr>
-        <p:txBody>
-          <a:bodyPr wrap="none" lIns="91440" tIns="45720" rIns="91440" bIns="45720">
-            <a:spAutoFit/>
-          </a:bodyPr>
-          <a:lstStyle/>
-          <a:p>
-            <a:pPr algn="ctr"/>
-            <a:r>
-              <a:rPr lang="de-CH" sz="5400" b="1" dirty="0" smtClean="0">
-                <a:ln w="22225">
-                  <a:solidFill>
-                    <a:schemeClr val="tx1"/>
-                  </a:solidFill>
-                  <a:prstDash val="solid"/>
-                </a:ln>
-                <a:solidFill>
-                  <a:srgbClr val="FFC000"/>
-                </a:solidFill>
-              </a:rPr>
-              <a:t>8</a:t>
             </a:r>
             <a:endParaRPr lang="de-CH" sz="5400" b="1" dirty="0">
               <a:ln w="22225">

</xml_diff>